<commit_message>
Removed GP, Template always hits, two new Heroes
</commit_message>
<xml_diff>
--- a/Characters/Character Sheet Template Magic Multiclass.pptx
+++ b/Characters/Character Sheet Template Magic Multiclass.pptx
@@ -243,7 +243,7 @@
           <a:p>
             <a:fld id="{0B4D85F4-ACAB-4D02-9EB8-5027950E88E8}" type="datetimeFigureOut">
               <a:rPr lang="de-AT" smtClean="0"/>
-              <a:t>28.11.2016</a:t>
+              <a:t>21.01.2017</a:t>
             </a:fld>
             <a:endParaRPr lang="de-AT"/>
           </a:p>
@@ -413,7 +413,7 @@
           <a:p>
             <a:fld id="{0B4D85F4-ACAB-4D02-9EB8-5027950E88E8}" type="datetimeFigureOut">
               <a:rPr lang="de-AT" smtClean="0"/>
-              <a:t>28.11.2016</a:t>
+              <a:t>21.01.2017</a:t>
             </a:fld>
             <a:endParaRPr lang="de-AT"/>
           </a:p>
@@ -593,7 +593,7 @@
           <a:p>
             <a:fld id="{0B4D85F4-ACAB-4D02-9EB8-5027950E88E8}" type="datetimeFigureOut">
               <a:rPr lang="de-AT" smtClean="0"/>
-              <a:t>28.11.2016</a:t>
+              <a:t>21.01.2017</a:t>
             </a:fld>
             <a:endParaRPr lang="de-AT"/>
           </a:p>
@@ -763,7 +763,7 @@
           <a:p>
             <a:fld id="{0B4D85F4-ACAB-4D02-9EB8-5027950E88E8}" type="datetimeFigureOut">
               <a:rPr lang="de-AT" smtClean="0"/>
-              <a:t>28.11.2016</a:t>
+              <a:t>21.01.2017</a:t>
             </a:fld>
             <a:endParaRPr lang="de-AT"/>
           </a:p>
@@ -1007,7 +1007,7 @@
           <a:p>
             <a:fld id="{0B4D85F4-ACAB-4D02-9EB8-5027950E88E8}" type="datetimeFigureOut">
               <a:rPr lang="de-AT" smtClean="0"/>
-              <a:t>28.11.2016</a:t>
+              <a:t>21.01.2017</a:t>
             </a:fld>
             <a:endParaRPr lang="de-AT"/>
           </a:p>
@@ -1239,7 +1239,7 @@
           <a:p>
             <a:fld id="{0B4D85F4-ACAB-4D02-9EB8-5027950E88E8}" type="datetimeFigureOut">
               <a:rPr lang="de-AT" smtClean="0"/>
-              <a:t>28.11.2016</a:t>
+              <a:t>21.01.2017</a:t>
             </a:fld>
             <a:endParaRPr lang="de-AT"/>
           </a:p>
@@ -1606,7 +1606,7 @@
           <a:p>
             <a:fld id="{0B4D85F4-ACAB-4D02-9EB8-5027950E88E8}" type="datetimeFigureOut">
               <a:rPr lang="de-AT" smtClean="0"/>
-              <a:t>28.11.2016</a:t>
+              <a:t>21.01.2017</a:t>
             </a:fld>
             <a:endParaRPr lang="de-AT"/>
           </a:p>
@@ -1724,7 +1724,7 @@
           <a:p>
             <a:fld id="{0B4D85F4-ACAB-4D02-9EB8-5027950E88E8}" type="datetimeFigureOut">
               <a:rPr lang="de-AT" smtClean="0"/>
-              <a:t>28.11.2016</a:t>
+              <a:t>21.01.2017</a:t>
             </a:fld>
             <a:endParaRPr lang="de-AT"/>
           </a:p>
@@ -1819,7 +1819,7 @@
           <a:p>
             <a:fld id="{0B4D85F4-ACAB-4D02-9EB8-5027950E88E8}" type="datetimeFigureOut">
               <a:rPr lang="de-AT" smtClean="0"/>
-              <a:t>28.11.2016</a:t>
+              <a:t>21.01.2017</a:t>
             </a:fld>
             <a:endParaRPr lang="de-AT"/>
           </a:p>
@@ -2096,7 +2096,7 @@
           <a:p>
             <a:fld id="{0B4D85F4-ACAB-4D02-9EB8-5027950E88E8}" type="datetimeFigureOut">
               <a:rPr lang="de-AT" smtClean="0"/>
-              <a:t>28.11.2016</a:t>
+              <a:t>21.01.2017</a:t>
             </a:fld>
             <a:endParaRPr lang="de-AT"/>
           </a:p>
@@ -2353,7 +2353,7 @@
           <a:p>
             <a:fld id="{0B4D85F4-ACAB-4D02-9EB8-5027950E88E8}" type="datetimeFigureOut">
               <a:rPr lang="de-AT" smtClean="0"/>
-              <a:t>28.11.2016</a:t>
+              <a:t>21.01.2017</a:t>
             </a:fld>
             <a:endParaRPr lang="de-AT"/>
           </a:p>
@@ -2566,7 +2566,7 @@
           <a:p>
             <a:fld id="{0B4D85F4-ACAB-4D02-9EB8-5027950E88E8}" type="datetimeFigureOut">
               <a:rPr lang="de-AT" smtClean="0"/>
-              <a:t>28.11.2016</a:t>
+              <a:t>21.01.2017</a:t>
             </a:fld>
             <a:endParaRPr lang="de-AT"/>
           </a:p>
@@ -4264,7 +4264,7 @@
               <a:rPr lang="en-US" sz="1050" dirty="0">
                 <a:latin typeface="Amaranth" panose="02000503050000020004" pitchFamily="50" charset="0"/>
               </a:rPr>
-              <a:t>Class Tree</a:t>
+              <a:t>Class I</a:t>
             </a:r>
             <a:endParaRPr lang="de-AT" sz="1050" dirty="0">
               <a:latin typeface="Amaranth" panose="02000503050000020004" pitchFamily="50" charset="0"/>
@@ -4281,7 +4281,7 @@
           <p:nvPr>
             <p:extLst>
               <p:ext uri="{D42A27DB-BD31-4B8C-83A1-F6EECF244321}">
-                <p14:modId xmlns:p14="http://schemas.microsoft.com/office/powerpoint/2010/main" val="2848831935"/>
+                <p14:modId xmlns:p14="http://schemas.microsoft.com/office/powerpoint/2010/main" val="1861409655"/>
               </p:ext>
             </p:extLst>
           </p:nvPr>
@@ -4454,13 +4454,6 @@
                           <a:spcPts val="0"/>
                         </a:spcAft>
                       </a:pPr>
-                      <a:r>
-                        <a:rPr lang="de-AT" sz="800" dirty="0">
-                          <a:effectLst/>
-                          <a:latin typeface="Corbel" panose="020B0503020204020204" pitchFamily="34" charset="0"/>
-                        </a:rPr>
-                        <a:t> </a:t>
-                      </a:r>
                       <a:endParaRPr lang="de-AT" sz="800" dirty="0">
                         <a:effectLst/>
                         <a:latin typeface="Corbel" panose="020B0503020204020204" pitchFamily="34" charset="0"/>
@@ -4543,13 +4536,22 @@
                     <a:bodyPr/>
                     <a:lstStyle/>
                     <a:p>
-                      <a:pPr>
-                        <a:lnSpc>
-                          <a:spcPct val="107000"/>
-                        </a:lnSpc>
-                        <a:spcAft>
-                          <a:spcPts val="0"/>
-                        </a:spcAft>
+                      <a:pPr marL="0" marR="0" lvl="0" indent="0" algn="l" defTabSz="532729" rtl="0" eaLnBrk="1" fontAlgn="auto" latinLnBrk="0" hangingPunct="1">
+                        <a:lnSpc>
+                          <a:spcPct val="107000"/>
+                        </a:lnSpc>
+                        <a:spcBef>
+                          <a:spcPts val="0"/>
+                        </a:spcBef>
+                        <a:spcAft>
+                          <a:spcPts val="0"/>
+                        </a:spcAft>
+                        <a:buClrTx/>
+                        <a:buSzTx/>
+                        <a:buFontTx/>
+                        <a:buNone/>
+                        <a:tabLst/>
+                        <a:defRPr/>
                       </a:pPr>
                       <a:endParaRPr lang="de-AT" sz="800" dirty="0">
                         <a:effectLst/>
@@ -4619,22 +4621,24 @@
                     <a:bodyPr/>
                     <a:lstStyle/>
                     <a:p>
-                      <a:pPr>
-                        <a:lnSpc>
-                          <a:spcPct val="107000"/>
-                        </a:lnSpc>
-                        <a:spcAft>
-                          <a:spcPts val="0"/>
-                        </a:spcAft>
-                      </a:pPr>
-                      <a:r>
-                        <a:rPr lang="de-AT" sz="800">
-                          <a:effectLst/>
-                          <a:latin typeface="Corbel" panose="020B0503020204020204" pitchFamily="34" charset="0"/>
-                        </a:rPr>
-                        <a:t> </a:t>
-                      </a:r>
-                      <a:endParaRPr lang="de-AT" sz="800">
+                      <a:pPr marL="0" marR="0" lvl="0" indent="0" algn="l" defTabSz="532729" rtl="0" eaLnBrk="1" fontAlgn="auto" latinLnBrk="0" hangingPunct="1">
+                        <a:lnSpc>
+                          <a:spcPct val="107000"/>
+                        </a:lnSpc>
+                        <a:spcBef>
+                          <a:spcPts val="0"/>
+                        </a:spcBef>
+                        <a:spcAft>
+                          <a:spcPts val="0"/>
+                        </a:spcAft>
+                        <a:buClrTx/>
+                        <a:buSzTx/>
+                        <a:buFontTx/>
+                        <a:buNone/>
+                        <a:tabLst/>
+                        <a:defRPr/>
+                      </a:pPr>
+                      <a:endParaRPr lang="de-AT" sz="800" dirty="0">
                         <a:effectLst/>
                         <a:latin typeface="Corbel" panose="020B0503020204020204" pitchFamily="34" charset="0"/>
                         <a:ea typeface="DengXian" panose="02010600030101010101" pitchFamily="2" charset="-122"/>
@@ -5004,10 +5008,10 @@
           <a:p>
             <a:pPr algn="ctr"/>
             <a:r>
-              <a:rPr lang="en-US" sz="1050" dirty="0">
+              <a:rPr lang="en-US" sz="1050">
                 <a:latin typeface="Amaranth" panose="02000503050000020004" pitchFamily="50" charset="0"/>
               </a:rPr>
-              <a:t>Class Tree</a:t>
+              <a:t>Class II</a:t>
             </a:r>
             <a:endParaRPr lang="de-AT" sz="1050" dirty="0">
               <a:latin typeface="Amaranth" panose="02000503050000020004" pitchFamily="50" charset="0"/>

</xml_diff>